<commit_message>
Changed the way expected ballots are computed
Was lowballing expected ballots by using a ceiling on number of ballots used.
</commit_message>
<xml_diff>
--- a/BRAVO Table.pptx
+++ b/BRAVO Table.pptx
@@ -3105,41 +3105,57 @@
             <p:ph type="title"/>
           </p:nvPr>
         </p:nvSpPr>
-        <p:spPr/>
+        <p:spPr>
+          <a:xfrm>
+            <a:off x="457200" y="533400"/>
+            <a:ext cx="8229600" cy="1143000"/>
+          </a:xfrm>
+        </p:spPr>
         <p:txBody>
           <a:bodyPr>
-            <a:normAutofit fontScale="90000"/>
+            <a:noAutofit/>
           </a:bodyPr>
           <a:lstStyle/>
           <a:p>
             <a:r>
-              <a:rPr lang="en-US" sz="3600" dirty="0" smtClean="0"/>
-              <a:t>BRAVO </a:t>
-            </a:r>
-            <a:r>
-              <a:rPr lang="en-US" sz="3600" dirty="0" smtClean="0"/>
-              <a:t>Table computed </a:t>
-            </a:r>
-            <a:r>
-              <a:rPr lang="en-US" sz="3600" dirty="0" smtClean="0"/>
-              <a:t>using </a:t>
-            </a:r>
-            <a:r>
-              <a:rPr lang="en-US" sz="3600" i="1" dirty="0" err="1" smtClean="0"/>
+              <a:rPr lang="en-US" sz="2800" dirty="0" smtClean="0"/>
+              <a:t>BRAVO Table computed </a:t>
+            </a:r>
+            <a:r>
+              <a:rPr lang="en-US" sz="2800" u="sng" dirty="0" smtClean="0"/>
+              <a:t>without simulations </a:t>
+            </a:r>
+            <a:r>
+              <a:rPr lang="en-US" sz="2800" dirty="0" smtClean="0"/>
+              <a:t>using derived formulae</a:t>
+            </a:r>
+            <a:br>
+              <a:rPr lang="en-US" sz="2800" dirty="0" smtClean="0"/>
+            </a:br>
+            <a:r>
+              <a:rPr lang="en-US" sz="2800" dirty="0" smtClean="0"/>
+              <a:t>Code:</a:t>
+            </a:r>
+            <a:r>
+              <a:rPr lang="en-US" sz="2800" dirty="0" smtClean="0"/>
+              <a:t> </a:t>
+            </a:r>
+            <a:r>
+              <a:rPr lang="en-US" sz="2800" i="1" dirty="0" err="1" smtClean="0"/>
               <a:t>BSquareBRAVOTestScript</a:t>
             </a:r>
             <a:r>
-              <a:rPr lang="en-US" sz="3600" dirty="0" smtClean="0"/>
+              <a:rPr lang="en-US" sz="2800" dirty="0" smtClean="0"/>
               <a:t/>
             </a:r>
             <a:br>
-              <a:rPr lang="en-US" sz="3600" dirty="0" smtClean="0"/>
+              <a:rPr lang="en-US" sz="2800" dirty="0" smtClean="0"/>
             </a:br>
             <a:r>
-              <a:rPr lang="en-US" sz="3100" dirty="0" smtClean="0"/>
+              <a:rPr lang="en-US" sz="2400" dirty="0" smtClean="0"/>
               <a:t>BRAVO Table values in parentheses</a:t>
             </a:r>
-            <a:endParaRPr lang="en-US" dirty="0"/>
+            <a:endParaRPr lang="en-US" sz="3600" dirty="0"/>
           </a:p>
         </p:txBody>
       </p:sp>
@@ -3152,7 +3168,7 @@
           <p:nvPr>
             <p:extLst>
               <p:ext uri="{D42A27DB-BD31-4B8C-83A1-F6EECF244321}">
-                <p14:modId xmlns:p14="http://schemas.microsoft.com/office/powerpoint/2010/main" val="4146601279"/>
+                <p14:modId xmlns:p14="http://schemas.microsoft.com/office/powerpoint/2010/main" val="1072930505"/>
               </p:ext>
             </p:extLst>
           </p:nvPr>
@@ -3376,7 +3392,11 @@
                     <a:p>
                       <a:r>
                         <a:rPr lang="en-US" dirty="0" smtClean="0"/>
-                        <a:t>31.47 (30)</a:t>
+                        <a:t>29.47 </a:t>
+                      </a:r>
+                      <a:r>
+                        <a:rPr lang="en-US" dirty="0" smtClean="0"/>
+                        <a:t>(30)</a:t>
                       </a:r>
                       <a:endParaRPr lang="en-US" dirty="0"/>
                     </a:p>
@@ -3476,7 +3496,11 @@
                     <a:p>
                       <a:r>
                         <a:rPr lang="en-US" dirty="0" smtClean="0"/>
-                        <a:t>54.66 (53)</a:t>
+                        <a:t>52.83 </a:t>
+                      </a:r>
+                      <a:r>
+                        <a:rPr lang="en-US" dirty="0" smtClean="0"/>
+                        <a:t>(53)</a:t>
                       </a:r>
                       <a:endParaRPr lang="en-US" dirty="0"/>
                     </a:p>
@@ -3576,7 +3600,7 @@
                     <a:p>
                       <a:r>
                         <a:rPr lang="en-US" dirty="0" smtClean="0"/>
-                        <a:t>118.89 </a:t>
+                        <a:t>118.00 (119) </a:t>
                       </a:r>
                       <a:endParaRPr lang="en-US" dirty="0"/>
                     </a:p>
@@ -3680,7 +3704,11 @@
                     <a:p>
                       <a:r>
                         <a:rPr lang="en-US" dirty="0" smtClean="0"/>
-                        <a:t>183.31 (184)</a:t>
+                        <a:t>183.60 </a:t>
+                      </a:r>
+                      <a:r>
+                        <a:rPr lang="en-US" dirty="0" smtClean="0"/>
+                        <a:t>(184)</a:t>
                       </a:r>
                       <a:endParaRPr lang="en-US" dirty="0"/>
                     </a:p>
@@ -3784,7 +3812,11 @@
                     <a:p>
                       <a:r>
                         <a:rPr lang="en-US" dirty="0" smtClean="0"/>
-                        <a:t>460.75 (469)</a:t>
+                        <a:t>466.47 </a:t>
+                      </a:r>
+                      <a:r>
+                        <a:rPr lang="en-US" dirty="0" smtClean="0"/>
+                        <a:t>(469)</a:t>
                       </a:r>
                       <a:endParaRPr lang="en-US" dirty="0"/>
                     </a:p>

</xml_diff>